<commit_message>
Add meeting minutes, journal, and poster updates
</commit_message>
<xml_diff>
--- a/doc/URC_Poster.pptx
+++ b/doc/URC_Poster.pptx
@@ -2714,8 +2714,8 @@
         </p:nvSpPr>
         <p:spPr>
           <a:xfrm>
-            <a:off x="3017520" y="1752480"/>
-            <a:ext cx="37855440" cy="6361920"/>
+            <a:off x="2194560" y="1313280"/>
+            <a:ext cx="39501360" cy="5496480"/>
           </a:xfrm>
           <a:prstGeom prst="rect">
             <a:avLst/>
@@ -2749,7 +2749,7 @@
         <p:spPr>
           <a:xfrm>
             <a:off x="2194560" y="7702560"/>
-            <a:ext cx="39501720" cy="19092240"/>
+            <a:ext cx="39501360" cy="19091880"/>
           </a:xfrm>
           <a:prstGeom prst="rect">
             <a:avLst/>
@@ -2772,12 +2772,12 @@
               <a:buChar char=""/>
             </a:pPr>
             <a:r>
-              <a:rPr b="0" lang="en-US" sz="3200" spc="-1" strike="noStrike">
+              <a:rPr b="0" lang="en-US" sz="1800" spc="-1" strike="noStrike">
                 <a:latin typeface="Arial"/>
               </a:rPr>
               <a:t>Click to edit the outline text format</a:t>
             </a:r>
-            <a:endParaRPr b="0" lang="en-US" sz="3200" spc="-1" strike="noStrike">
+            <a:endParaRPr b="0" lang="en-US" sz="1800" spc="-1" strike="noStrike">
               <a:latin typeface="Arial"/>
             </a:endParaRPr>
           </a:p>
@@ -2794,12 +2794,12 @@
               <a:buChar char=""/>
             </a:pPr>
             <a:r>
-              <a:rPr b="0" lang="en-US" sz="2800" spc="-1" strike="noStrike">
+              <a:rPr b="0" lang="en-US" sz="1800" spc="-1" strike="noStrike">
                 <a:latin typeface="Arial"/>
               </a:rPr>
               <a:t>Second Outline Level</a:t>
             </a:r>
-            <a:endParaRPr b="0" lang="en-US" sz="2800" spc="-1" strike="noStrike">
+            <a:endParaRPr b="0" lang="en-US" sz="1800" spc="-1" strike="noStrike">
               <a:latin typeface="Arial"/>
             </a:endParaRPr>
           </a:p>
@@ -2816,12 +2816,12 @@
               <a:buChar char=""/>
             </a:pPr>
             <a:r>
-              <a:rPr b="0" lang="en-US" sz="2400" spc="-1" strike="noStrike">
+              <a:rPr b="0" lang="en-US" sz="1800" spc="-1" strike="noStrike">
                 <a:latin typeface="Arial"/>
               </a:rPr>
               <a:t>Third Outline Level</a:t>
             </a:r>
-            <a:endParaRPr b="0" lang="en-US" sz="2400" spc="-1" strike="noStrike">
+            <a:endParaRPr b="0" lang="en-US" sz="1800" spc="-1" strike="noStrike">
               <a:latin typeface="Arial"/>
             </a:endParaRPr>
           </a:p>
@@ -2838,12 +2838,12 @@
               <a:buChar char=""/>
             </a:pPr>
             <a:r>
-              <a:rPr b="0" lang="en-US" sz="2000" spc="-1" strike="noStrike">
+              <a:rPr b="0" lang="en-US" sz="1800" spc="-1" strike="noStrike">
                 <a:latin typeface="Arial"/>
               </a:rPr>
               <a:t>Fourth Outline Level</a:t>
             </a:r>
-            <a:endParaRPr b="0" lang="en-US" sz="2000" spc="-1" strike="noStrike">
+            <a:endParaRPr b="0" lang="en-US" sz="1800" spc="-1" strike="noStrike">
               <a:latin typeface="Arial"/>
             </a:endParaRPr>
           </a:p>
@@ -2860,12 +2860,12 @@
               <a:buChar char=""/>
             </a:pPr>
             <a:r>
-              <a:rPr b="0" lang="en-US" sz="2000" spc="-1" strike="noStrike">
+              <a:rPr b="0" lang="en-US" sz="1800" spc="-1" strike="noStrike">
                 <a:latin typeface="Arial"/>
               </a:rPr>
               <a:t>Fifth Outline Level</a:t>
             </a:r>
-            <a:endParaRPr b="0" lang="en-US" sz="2000" spc="-1" strike="noStrike">
+            <a:endParaRPr b="0" lang="en-US" sz="1800" spc="-1" strike="noStrike">
               <a:latin typeface="Arial"/>
             </a:endParaRPr>
           </a:p>
@@ -2882,12 +2882,12 @@
               <a:buChar char=""/>
             </a:pPr>
             <a:r>
-              <a:rPr b="0" lang="en-US" sz="2000" spc="-1" strike="noStrike">
+              <a:rPr b="0" lang="en-US" sz="1800" spc="-1" strike="noStrike">
                 <a:latin typeface="Arial"/>
               </a:rPr>
               <a:t>Sixth Outline Level</a:t>
             </a:r>
-            <a:endParaRPr b="0" lang="en-US" sz="2000" spc="-1" strike="noStrike">
+            <a:endParaRPr b="0" lang="en-US" sz="1800" spc="-1" strike="noStrike">
               <a:latin typeface="Arial"/>
             </a:endParaRPr>
           </a:p>
@@ -2904,12 +2904,12 @@
               <a:buChar char=""/>
             </a:pPr>
             <a:r>
-              <a:rPr b="0" lang="en-US" sz="2000" spc="-1" strike="noStrike">
+              <a:rPr b="0" lang="en-US" sz="1800" spc="-1" strike="noStrike">
                 <a:latin typeface="Arial"/>
               </a:rPr>
               <a:t>Seventh Outline Level</a:t>
             </a:r>
-            <a:endParaRPr b="0" lang="en-US" sz="2000" spc="-1" strike="noStrike">
+            <a:endParaRPr b="0" lang="en-US" sz="1800" spc="-1" strike="noStrike">
               <a:latin typeface="Arial"/>
             </a:endParaRPr>
           </a:p>
@@ -3223,7 +3223,7 @@
         <p:spPr>
           <a:xfrm>
             <a:off x="12531960" y="15240960"/>
-            <a:ext cx="8821080" cy="6615720"/>
+            <a:ext cx="8820720" cy="6615360"/>
           </a:xfrm>
           <a:prstGeom prst="rect">
             <a:avLst/>
@@ -3242,7 +3242,7 @@
         <p:spPr>
           <a:xfrm>
             <a:off x="369720" y="522360"/>
-            <a:ext cx="43135920" cy="3947040"/>
+            <a:ext cx="43135560" cy="3946680"/>
           </a:xfrm>
           <a:prstGeom prst="rect">
             <a:avLst/>
@@ -3319,7 +3319,7 @@
         <p:spPr>
           <a:xfrm>
             <a:off x="369720" y="6141600"/>
-            <a:ext cx="10913760" cy="9448560"/>
+            <a:ext cx="10913400" cy="9448200"/>
           </a:xfrm>
           <a:prstGeom prst="rect">
             <a:avLst/>
@@ -3342,22 +3342,7 @@
           <a:bodyPr lIns="106560" rIns="106560" tIns="53280" bIns="53280"/>
           <a:p>
             <a:r>
-              <a:rPr b="0" lang="en-US" sz="3200" spc="-1" strike="noStrike">
-                <a:solidFill>
-                  <a:srgbClr val="000000"/>
-                </a:solidFill>
-                <a:latin typeface="Source Sans Pro"/>
-                <a:ea typeface="Cambria"/>
-              </a:rPr>
-              <a:t>Rust is a new programming language being developed by Mozilla, released in 2015 aimed at system application developers. As a new systems language, it competes with deep-rooted languages such as C++, but it claims to be completely memory-safe, thread-safe, and to not lose any performance doing so.</a:t>
-            </a:r>
-            <a:endParaRPr b="0" lang="en-US" sz="3200" spc="-1" strike="noStrike">
-              <a:latin typeface="Arial"/>
-            </a:endParaRPr>
-          </a:p>
-          <a:p>
-            <a:r>
-              <a:rPr b="0" lang="en-US" sz="3200" spc="-1" strike="noStrike">
+              <a:rPr b="0" lang="en-US" sz="3600" spc="-1" strike="noStrike">
                 <a:solidFill>
                   <a:srgbClr val="000000"/>
                 </a:solidFill>
@@ -3367,7 +3352,7 @@
               <a:t>	</a:t>
             </a:r>
             <a:r>
-              <a:rPr b="0" lang="en-US" sz="3200" spc="-1" strike="noStrike">
+              <a:rPr b="0" lang="en-US" sz="3600" spc="-1" strike="noStrike">
                 <a:solidFill>
                   <a:srgbClr val="000000"/>
                 </a:solidFill>
@@ -3376,32 +3361,7 @@
               </a:rPr>
               <a:t>The purpose of this project was to compare Rust with C++. Rust was tested to see if it held up to its claims of being nearly as performant as C++, and if the language made writing safe programs easy. These tests and analysis were carried out using three small programs written at least twice in each Rust and C++. Each implementation attempted to use as similar an algorithm as possible to solve the problem at hand, and were used to benchmark performance.</a:t>
             </a:r>
-            <a:endParaRPr b="0" lang="en-US" sz="3200" spc="-1" strike="noStrike">
-              <a:latin typeface="Arial"/>
-            </a:endParaRPr>
-          </a:p>
-          <a:p>
-            <a:r>
-              <a:rPr b="0" lang="en-US" sz="3200" spc="-1" strike="noStrike">
-                <a:solidFill>
-                  <a:srgbClr val="000000"/>
-                </a:solidFill>
-                <a:latin typeface="Source Sans Pro"/>
-                <a:ea typeface="Cambria"/>
-              </a:rPr>
-              <a:t>	</a:t>
-            </a:r>
-            <a:r>
-              <a:rPr b="0" lang="en-US" sz="3200" spc="-1" strike="noStrike">
-                <a:solidFill>
-                  <a:srgbClr val="000000"/>
-                </a:solidFill>
-                <a:latin typeface="Source Sans Pro"/>
-                <a:ea typeface="Cambria"/>
-              </a:rPr>
-              <a:t>The two compilers used for this comparison were clang++ and rustc. These two compilers were chosen because of their ability to both generate LLVM IR, which we looked at to see how each compiler implemented language constructs used in each language. </a:t>
-            </a:r>
-            <a:endParaRPr b="0" lang="en-US" sz="3200" spc="-1" strike="noStrike">
+            <a:endParaRPr b="0" lang="en-US" sz="3600" spc="-1" strike="noStrike">
               <a:latin typeface="Arial"/>
             </a:endParaRPr>
           </a:p>
@@ -3416,7 +3376,7 @@
         <p:spPr>
           <a:xfrm>
             <a:off x="369720" y="15891480"/>
-            <a:ext cx="10913760" cy="912600"/>
+            <a:ext cx="10913400" cy="912240"/>
           </a:xfrm>
           <a:prstGeom prst="rect">
             <a:avLst/>
@@ -3480,7 +3440,7 @@
         <p:spPr>
           <a:xfrm>
             <a:off x="12314160" y="4937760"/>
-            <a:ext cx="19641240" cy="700200"/>
+            <a:ext cx="19640880" cy="699840"/>
           </a:xfrm>
           <a:prstGeom prst="rect">
             <a:avLst/>
@@ -3534,7 +3494,7 @@
         <p:spPr>
           <a:xfrm>
             <a:off x="32572080" y="15157800"/>
-            <a:ext cx="10914120" cy="7043760"/>
+            <a:ext cx="10913760" cy="7043400"/>
           </a:xfrm>
           <a:prstGeom prst="rect">
             <a:avLst/>
@@ -3586,7 +3546,7 @@
         <p:spPr>
           <a:xfrm>
             <a:off x="369720" y="4927680"/>
-            <a:ext cx="10914120" cy="912600"/>
+            <a:ext cx="10913760" cy="912240"/>
           </a:xfrm>
           <a:prstGeom prst="rect">
             <a:avLst/>
@@ -3640,7 +3600,7 @@
         <p:spPr>
           <a:xfrm>
             <a:off x="32591520" y="4927680"/>
-            <a:ext cx="10914120" cy="912600"/>
+            <a:ext cx="10913760" cy="912240"/>
           </a:xfrm>
           <a:prstGeom prst="rect">
             <a:avLst/>
@@ -3694,7 +3654,7 @@
         <p:spPr>
           <a:xfrm>
             <a:off x="12300480" y="6000120"/>
-            <a:ext cx="19641240" cy="7182360"/>
+            <a:ext cx="19640880" cy="7182000"/>
           </a:xfrm>
           <a:prstGeom prst="rect">
             <a:avLst/>
@@ -3716,7 +3676,7 @@
         <p:txBody>
           <a:bodyPr lIns="106560" rIns="106560" tIns="53280" bIns="53280"/>
           <a:p>
-            <a:pPr marL="457200" indent="-462960">
+            <a:pPr marL="457200" indent="-462600">
               <a:lnSpc>
                 <a:spcPct val="90000"/>
               </a:lnSpc>
@@ -3737,11 +3697,11 @@
               <a:t>Compare the performance of rustc and clang++ to see if rustc can generate programs as performant as clang++</a:t>
             </a:r>
             <a:endParaRPr b="0" lang="en-US" sz="3200" spc="-1" strike="noStrike">
-              <a:latin typeface="Source Sans Pro"/>
-            </a:endParaRPr>
-          </a:p>
-          <a:p>
-            <a:pPr marL="457200" indent="-462960">
+              <a:latin typeface="Arial"/>
+            </a:endParaRPr>
+          </a:p>
+          <a:p>
+            <a:pPr marL="457200" indent="-462600">
               <a:lnSpc>
                 <a:spcPct val="90000"/>
               </a:lnSpc>
@@ -3762,11 +3722,11 @@
               <a:t>Highlight the different capabilities of the languages, in both an objective view on feature comparison and a subjective view regarding usability.</a:t>
             </a:r>
             <a:endParaRPr b="0" lang="en-US" sz="3200" spc="-1" strike="noStrike">
-              <a:latin typeface="Source Sans Pro"/>
-            </a:endParaRPr>
-          </a:p>
-          <a:p>
-            <a:pPr marL="457200" indent="-462960">
+              <a:latin typeface="Arial"/>
+            </a:endParaRPr>
+          </a:p>
+          <a:p>
+            <a:pPr marL="457200" indent="-462600">
               <a:lnSpc>
                 <a:spcPct val="90000"/>
               </a:lnSpc>
@@ -3787,7 +3747,7 @@
               <a:t>Analyze the data structures used by each compiler and compare the optimizations made when the performance difference between programs written in each language is not obvious.</a:t>
             </a:r>
             <a:endParaRPr b="0" lang="en-US" sz="3200" spc="-1" strike="noStrike">
-              <a:latin typeface="Source Sans Pro"/>
+              <a:latin typeface="Arial"/>
             </a:endParaRPr>
           </a:p>
         </p:txBody>
@@ -3801,7 +3761,7 @@
         <p:spPr>
           <a:xfrm>
             <a:off x="32492880" y="13650480"/>
-            <a:ext cx="10914120" cy="912600"/>
+            <a:ext cx="10913760" cy="912240"/>
           </a:xfrm>
           <a:prstGeom prst="rect">
             <a:avLst/>
@@ -3855,7 +3815,7 @@
         <p:spPr>
           <a:xfrm>
             <a:off x="32591520" y="22552920"/>
-            <a:ext cx="10914120" cy="632880"/>
+            <a:ext cx="10913760" cy="632520"/>
           </a:xfrm>
           <a:prstGeom prst="rect">
             <a:avLst/>
@@ -3909,7 +3869,7 @@
         <p:spPr>
           <a:xfrm>
             <a:off x="32572080" y="6141600"/>
-            <a:ext cx="10914120" cy="7040880"/>
+            <a:ext cx="10913760" cy="7040520"/>
           </a:xfrm>
           <a:prstGeom prst="rect">
             <a:avLst/>
@@ -3961,7 +3921,7 @@
         <p:spPr>
           <a:xfrm>
             <a:off x="12125520" y="13777920"/>
-            <a:ext cx="19641240" cy="867600"/>
+            <a:ext cx="19640880" cy="867240"/>
           </a:xfrm>
           <a:prstGeom prst="rect">
             <a:avLst/>
@@ -4015,7 +3975,7 @@
         <p:spPr>
           <a:xfrm>
             <a:off x="12333600" y="23063400"/>
-            <a:ext cx="19641240" cy="7892640"/>
+            <a:ext cx="19640880" cy="7892280"/>
           </a:xfrm>
           <a:prstGeom prst="rect">
             <a:avLst/>
@@ -4044,7 +4004,7 @@
         <p:spPr>
           <a:xfrm>
             <a:off x="22154400" y="23063400"/>
-            <a:ext cx="360" cy="7892640"/>
+            <a:ext cx="360" cy="7892280"/>
           </a:xfrm>
           <a:custGeom>
             <a:avLst/>
@@ -4086,7 +4046,7 @@
         <p:spPr>
           <a:xfrm>
             <a:off x="12333600" y="15157800"/>
-            <a:ext cx="19641240" cy="7043760"/>
+            <a:ext cx="19640880" cy="7043400"/>
           </a:xfrm>
           <a:prstGeom prst="rect">
             <a:avLst/>
@@ -4115,7 +4075,7 @@
         <p:spPr>
           <a:xfrm>
             <a:off x="22154400" y="15157800"/>
-            <a:ext cx="360" cy="7043760"/>
+            <a:ext cx="360" cy="7043400"/>
           </a:xfrm>
           <a:custGeom>
             <a:avLst/>
@@ -4161,7 +4121,7 @@
         <p:spPr>
           <a:xfrm>
             <a:off x="2656800" y="1168920"/>
-            <a:ext cx="2297880" cy="3041640"/>
+            <a:ext cx="2297520" cy="3041280"/>
           </a:xfrm>
           <a:prstGeom prst="rect">
             <a:avLst/>
@@ -4180,7 +4140,7 @@
         <p:spPr>
           <a:xfrm>
             <a:off x="32552280" y="27902520"/>
-            <a:ext cx="10914120" cy="4188600"/>
+            <a:ext cx="10913760" cy="4188240"/>
           </a:xfrm>
           <a:prstGeom prst="rect">
             <a:avLst/>
@@ -4209,7 +4169,7 @@
         <p:spPr>
           <a:xfrm>
             <a:off x="32591520" y="26777880"/>
-            <a:ext cx="10914120" cy="632880"/>
+            <a:ext cx="10913760" cy="632520"/>
           </a:xfrm>
           <a:prstGeom prst="rect">
             <a:avLst/>
@@ -4263,7 +4223,7 @@
         <p:spPr>
           <a:xfrm>
             <a:off x="32985000" y="12216960"/>
-            <a:ext cx="5656680" cy="553320"/>
+            <a:ext cx="5656320" cy="552960"/>
           </a:xfrm>
           <a:prstGeom prst="rect">
             <a:avLst/>
@@ -4289,7 +4249,7 @@
         <p:spPr>
           <a:xfrm>
             <a:off x="37950480" y="1168920"/>
-            <a:ext cx="3637080" cy="2515320"/>
+            <a:ext cx="3636720" cy="2514960"/>
           </a:xfrm>
           <a:prstGeom prst="rect">
             <a:avLst/>
@@ -4343,7 +4303,7 @@
         <p:spPr>
           <a:xfrm>
             <a:off x="369720" y="17105400"/>
-            <a:ext cx="10913760" cy="6303240"/>
+            <a:ext cx="10913400" cy="6302880"/>
           </a:xfrm>
           <a:prstGeom prst="rect">
             <a:avLst/>
@@ -4365,7 +4325,7 @@
         <p:txBody>
           <a:bodyPr lIns="106560" rIns="106560" tIns="53280" bIns="53280"/>
           <a:p>
-            <a:pPr marL="216000" indent="-215640">
+            <a:pPr marL="216000" indent="-215280">
               <a:lnSpc>
                 <a:spcPct val="90000"/>
               </a:lnSpc>
@@ -4377,21 +4337,21 @@
               <a:buChar char=""/>
             </a:pPr>
             <a:r>
-              <a:rPr b="0" lang="en-US" sz="3200" spc="-1" strike="noStrike">
+              <a:rPr b="0" lang="en-US" sz="3600" spc="-1" strike="noStrike">
                 <a:solidFill>
                   <a:srgbClr val="000000"/>
                 </a:solidFill>
                 <a:latin typeface="Source Sans Pro"/>
                 <a:ea typeface="Cambria"/>
               </a:rPr>
-              <a:t>Write three programs, “Pi-digits”, “Jacobi”, and “Wordfind” in each langauge</a:t>
+              <a:t>Write three programs, “Pi-digits”, “Jacobi”, and “Wordfind” in each language with similar algorithms</a:t>
             </a:r>
-            <a:endParaRPr b="0" lang="en-US" sz="3200" spc="-1" strike="noStrike">
-              <a:latin typeface="Source Sans Pro"/>
-            </a:endParaRPr>
-          </a:p>
-          <a:p>
-            <a:pPr marL="216000" indent="-215640">
+            <a:endParaRPr b="0" lang="en-US" sz="3600" spc="-1" strike="noStrike">
+              <a:latin typeface="Arial"/>
+            </a:endParaRPr>
+          </a:p>
+          <a:p>
+            <a:pPr marL="216000" indent="-215280">
               <a:lnSpc>
                 <a:spcPct val="90000"/>
               </a:lnSpc>
@@ -4403,21 +4363,21 @@
               <a:buChar char=""/>
             </a:pPr>
             <a:r>
-              <a:rPr b="0" lang="en-US" sz="3200" spc="-1" strike="noStrike">
+              <a:rPr b="0" lang="en-US" sz="3600" spc="-1" strike="noStrike">
                 <a:solidFill>
                   <a:srgbClr val="000000"/>
                 </a:solidFill>
                 <a:latin typeface="Source Sans Pro"/>
                 <a:ea typeface="Cambria"/>
               </a:rPr>
-              <a:t>Write each program twice, once in Rust, and again in C++</a:t>
+              <a:t>Alternate which language each member writes in to allow each to gain experience with Rust</a:t>
             </a:r>
-            <a:endParaRPr b="0" lang="en-US" sz="3200" spc="-1" strike="noStrike">
-              <a:latin typeface="Source Sans Pro"/>
-            </a:endParaRPr>
-          </a:p>
-          <a:p>
-            <a:pPr marL="216000" indent="-215640">
+            <a:endParaRPr b="0" lang="en-US" sz="3600" spc="-1" strike="noStrike">
+              <a:latin typeface="Arial"/>
+            </a:endParaRPr>
+          </a:p>
+          <a:p>
+            <a:pPr marL="216000" indent="-215280">
               <a:lnSpc>
                 <a:spcPct val="90000"/>
               </a:lnSpc>
@@ -4429,21 +4389,21 @@
               <a:buChar char=""/>
             </a:pPr>
             <a:r>
-              <a:rPr b="0" lang="en-US" sz="3200" spc="-1" strike="noStrike">
+              <a:rPr b="0" lang="en-US" sz="3600" spc="-1" strike="noStrike">
                 <a:solidFill>
                   <a:srgbClr val="000000"/>
                 </a:solidFill>
                 <a:latin typeface="Source Sans Pro"/>
                 <a:ea typeface="Cambria"/>
               </a:rPr>
-              <a:t>Implement the programs in each langauge with as similar an algorithm as possible, to the extent that the language allows</a:t>
+              <a:t>Objectively analyze program performanace during runtime on a machine with no extraneous processes running</a:t>
             </a:r>
-            <a:endParaRPr b="0" lang="en-US" sz="3200" spc="-1" strike="noStrike">
-              <a:latin typeface="Source Sans Pro"/>
-            </a:endParaRPr>
-          </a:p>
-          <a:p>
-            <a:pPr marL="216000" indent="-215640">
+            <a:endParaRPr b="0" lang="en-US" sz="3600" spc="-1" strike="noStrike">
+              <a:latin typeface="Arial"/>
+            </a:endParaRPr>
+          </a:p>
+          <a:p>
+            <a:pPr marL="216000" indent="-215280">
               <a:lnSpc>
                 <a:spcPct val="90000"/>
               </a:lnSpc>
@@ -4455,21 +4415,21 @@
               <a:buChar char=""/>
             </a:pPr>
             <a:r>
-              <a:rPr b="0" lang="en-US" sz="3200" spc="-1" strike="noStrike">
+              <a:rPr b="0" lang="en-US" sz="3600" spc="-1" strike="noStrike">
                 <a:solidFill>
                   <a:srgbClr val="000000"/>
                 </a:solidFill>
                 <a:latin typeface="Source Sans Pro"/>
                 <a:ea typeface="Cambria"/>
               </a:rPr>
-              <a:t>Alternate which language each member writes in to allow each to gain experience with Rust</a:t>
+              <a:t>Subjectively remark and report on the ease-of-use of each language</a:t>
             </a:r>
-            <a:endParaRPr b="0" lang="en-US" sz="3200" spc="-1" strike="noStrike">
-              <a:latin typeface="Source Sans Pro"/>
-            </a:endParaRPr>
-          </a:p>
-          <a:p>
-            <a:pPr marL="216000" indent="-215640">
+            <a:endParaRPr b="0" lang="en-US" sz="3600" spc="-1" strike="noStrike">
+              <a:latin typeface="Arial"/>
+            </a:endParaRPr>
+          </a:p>
+          <a:p>
+            <a:pPr marL="216000" indent="-215280">
               <a:lnSpc>
                 <a:spcPct val="90000"/>
               </a:lnSpc>
@@ -4481,59 +4441,7 @@
               <a:buChar char=""/>
             </a:pPr>
             <a:r>
-              <a:rPr b="0" lang="en-US" sz="3200" spc="-1" strike="noStrike">
-                <a:solidFill>
-                  <a:srgbClr val="000000"/>
-                </a:solidFill>
-                <a:latin typeface="Source Sans Pro"/>
-                <a:ea typeface="Cambria"/>
-              </a:rPr>
-              <a:t>Objectively analyze program performance during runtime on a machine with no extraneous processes running</a:t>
-            </a:r>
-            <a:endParaRPr b="0" lang="en-US" sz="3200" spc="-1" strike="noStrike">
-              <a:latin typeface="Source Sans Pro"/>
-            </a:endParaRPr>
-          </a:p>
-          <a:p>
-            <a:pPr marL="216000" indent="-215640">
-              <a:lnSpc>
-                <a:spcPct val="90000"/>
-              </a:lnSpc>
-              <a:buClr>
-                <a:srgbClr val="000000"/>
-              </a:buClr>
-              <a:buSzPct val="45000"/>
-              <a:buFont typeface="Wingdings" charset="2"/>
-              <a:buChar char=""/>
-            </a:pPr>
-            <a:r>
-              <a:rPr b="0" lang="en-US" sz="3200" spc="-1" strike="noStrike">
-                <a:solidFill>
-                  <a:srgbClr val="000000"/>
-                </a:solidFill>
-                <a:latin typeface="Source Sans Pro"/>
-                <a:ea typeface="Cambria"/>
-              </a:rPr>
-              <a:t>Subjectively remark and report on the ease-of-use of each language</a:t>
-            </a:r>
-            <a:endParaRPr b="0" lang="en-US" sz="3200" spc="-1" strike="noStrike">
-              <a:latin typeface="Source Sans Pro"/>
-            </a:endParaRPr>
-          </a:p>
-          <a:p>
-            <a:pPr marL="216000" indent="-215640">
-              <a:lnSpc>
-                <a:spcPct val="90000"/>
-              </a:lnSpc>
-              <a:buClr>
-                <a:srgbClr val="000000"/>
-              </a:buClr>
-              <a:buSzPct val="45000"/>
-              <a:buFont typeface="Wingdings" charset="2"/>
-              <a:buChar char=""/>
-            </a:pPr>
-            <a:r>
-              <a:rPr b="0" lang="en-US" sz="3200" spc="-1" strike="noStrike">
+              <a:rPr b="0" lang="en-US" sz="3600" spc="-1" strike="noStrike">
                 <a:solidFill>
                   <a:srgbClr val="000000"/>
                 </a:solidFill>
@@ -4542,8 +4450,8 @@
               </a:rPr>
               <a:t>Graph the performance of each program over an average of runs to reduce performance intermittent performance anomalies.</a:t>
             </a:r>
-            <a:endParaRPr b="0" lang="en-US" sz="3200" spc="-1" strike="noStrike">
-              <a:latin typeface="Source Sans Pro"/>
+            <a:endParaRPr b="0" lang="en-US" sz="3600" spc="-1" strike="noStrike">
+              <a:latin typeface="Arial"/>
             </a:endParaRPr>
           </a:p>
         </p:txBody>
@@ -4557,7 +4465,7 @@
         <p:spPr>
           <a:xfrm>
             <a:off x="14371200" y="15240960"/>
-            <a:ext cx="5461200" cy="722520"/>
+            <a:ext cx="5460840" cy="722160"/>
           </a:xfrm>
           <a:prstGeom prst="rect">
             <a:avLst/>
@@ -4606,7 +4514,7 @@
         <p:spPr>
           <a:xfrm>
             <a:off x="32726520" y="23658840"/>
-            <a:ext cx="10914120" cy="2768760"/>
+            <a:ext cx="10913760" cy="2768400"/>
           </a:xfrm>
           <a:prstGeom prst="rect">
             <a:avLst/>
@@ -4682,7 +4590,7 @@
         <p:spPr>
           <a:xfrm>
             <a:off x="22551840" y="15256080"/>
-            <a:ext cx="8821080" cy="6615720"/>
+            <a:ext cx="8820720" cy="6615360"/>
           </a:xfrm>
           <a:prstGeom prst="rect">
             <a:avLst/>
@@ -4701,7 +4609,7 @@
         <p:spPr>
           <a:xfrm>
             <a:off x="24488280" y="15240960"/>
-            <a:ext cx="5461200" cy="722520"/>
+            <a:ext cx="5460840" cy="722160"/>
           </a:xfrm>
           <a:prstGeom prst="rect">
             <a:avLst/>
@@ -4754,7 +4662,7 @@
         <p:spPr>
           <a:xfrm>
             <a:off x="12407760" y="23489280"/>
-            <a:ext cx="9388080" cy="7040880"/>
+            <a:ext cx="9387720" cy="7040520"/>
           </a:xfrm>
           <a:prstGeom prst="rect">
             <a:avLst/>
@@ -4773,7 +4681,7 @@
         <p:spPr>
           <a:xfrm>
             <a:off x="22825440" y="23565960"/>
-            <a:ext cx="8283600" cy="6615360"/>
+            <a:ext cx="8283240" cy="6615000"/>
           </a:xfrm>
           <a:prstGeom prst="triangle">
             <a:avLst>
@@ -4806,7 +4714,7 @@
         <p:spPr>
           <a:xfrm>
             <a:off x="14558760" y="23489280"/>
-            <a:ext cx="5461200" cy="722520"/>
+            <a:ext cx="5460840" cy="722160"/>
           </a:xfrm>
           <a:prstGeom prst="rect">
             <a:avLst/>
@@ -4855,7 +4763,7 @@
         <p:spPr>
           <a:xfrm>
             <a:off x="365760" y="23774400"/>
-            <a:ext cx="10913760" cy="912600"/>
+            <a:ext cx="10913400" cy="912240"/>
           </a:xfrm>
           <a:prstGeom prst="rect">
             <a:avLst/>
@@ -4919,7 +4827,7 @@
         <p:spPr>
           <a:xfrm>
             <a:off x="333360" y="25054560"/>
-            <a:ext cx="10913760" cy="6669000"/>
+            <a:ext cx="10913400" cy="5212080"/>
           </a:xfrm>
           <a:prstGeom prst="rect">
             <a:avLst/>
@@ -4941,18 +4849,19 @@
         <p:txBody>
           <a:bodyPr lIns="106560" rIns="106560" tIns="53280" bIns="53280"/>
           <a:p>
-            <a:pPr marL="216000" indent="-215640">
+            <a:pPr marL="216000" indent="-216000">
               <a:lnSpc>
                 <a:spcPct val="90000"/>
               </a:lnSpc>
               <a:buClr>
                 <a:srgbClr val="000000"/>
               </a:buClr>
+              <a:buSzPct val="45000"/>
               <a:buFont typeface="Wingdings" charset="2"/>
-              <a:buAutoNum type="arabicParenR"/>
+              <a:buChar char=""/>
             </a:pPr>
             <a:r>
-              <a:rPr b="0" lang="en-US" sz="3200" spc="-1" strike="noStrike">
+              <a:rPr b="0" lang="en-US" sz="3600" spc="-1" strike="noStrike">
                 <a:solidFill>
                   <a:srgbClr val="000000"/>
                 </a:solidFill>
@@ -4962,32 +4871,33 @@
               <a:t> “</a:t>
             </a:r>
             <a:r>
-              <a:rPr b="0" lang="en-US" sz="3200" spc="-1" strike="noStrike">
+              <a:rPr b="0" lang="en-US" sz="3600" spc="-1" strike="noStrike">
                 <a:solidFill>
                   <a:srgbClr val="000000"/>
                 </a:solidFill>
                 <a:latin typeface="Source Sans Pro"/>
                 <a:ea typeface="Cambria"/>
               </a:rPr>
-              <a:t>Pi-digits” is a concurrent implementation of using Reimann sums to compute the value of pi. The intervals under the curve are divided among the threads being run and the result of the computation performed in each thread is summed at the end.</a:t>
+              <a:t>Pi-digits” is a concurrent implementation of using Reimann sums to compute the value of pi.</a:t>
             </a:r>
-            <a:endParaRPr b="0" lang="en-US" sz="3200" spc="-1" strike="noStrike">
+            <a:endParaRPr b="0" lang="en-US" sz="3600" spc="-1" strike="noStrike">
               <a:latin typeface="Source Sans Pro"/>
             </a:endParaRPr>
           </a:p>
           <a:p>
-            <a:pPr marL="216000" indent="-215640">
+            <a:pPr marL="216000" indent="-216000">
               <a:lnSpc>
                 <a:spcPct val="90000"/>
               </a:lnSpc>
               <a:buClr>
                 <a:srgbClr val="000000"/>
               </a:buClr>
+              <a:buSzPct val="45000"/>
               <a:buFont typeface="Wingdings" charset="2"/>
-              <a:buAutoNum type="arabicParenR"/>
+              <a:buChar char=""/>
             </a:pPr>
             <a:r>
-              <a:rPr b="0" lang="en-US" sz="3200" spc="-1" strike="noStrike">
+              <a:rPr b="0" lang="en-US" sz="3600" spc="-1" strike="noStrike">
                 <a:solidFill>
                   <a:srgbClr val="000000"/>
                 </a:solidFill>
@@ -4997,32 +4907,33 @@
               <a:t> “</a:t>
             </a:r>
             <a:r>
-              <a:rPr b="0" lang="en-US" sz="3200" spc="-1" strike="noStrike">
+              <a:rPr b="0" lang="en-US" sz="3600" spc="-1" strike="noStrike">
                 <a:solidFill>
                   <a:srgbClr val="000000"/>
                 </a:solidFill>
                 <a:latin typeface="Source Sans Pro"/>
                 <a:ea typeface="Cambria"/>
               </a:rPr>
-              <a:t>Jacobi” runs the Jacobi temperature distribution algorithm concurrently by subdividing the array where the computation is being performed horizontally between threads. Jacobi was implemented 4 times with two different methods; The hard to explain performance is the reason for this.</a:t>
+              <a:t>Jacobi” runs the Jacobi temperature distribution algorithm concurrently by subdividing the array where the computation is being performed horizontally between threads. Implemented four times, in two different ways.</a:t>
             </a:r>
-            <a:endParaRPr b="0" lang="en-US" sz="3200" spc="-1" strike="noStrike">
+            <a:endParaRPr b="0" lang="en-US" sz="3600" spc="-1" strike="noStrike">
               <a:latin typeface="Source Sans Pro"/>
             </a:endParaRPr>
           </a:p>
           <a:p>
-            <a:pPr marL="216000" indent="-215640">
+            <a:pPr marL="216000" indent="-216000">
               <a:lnSpc>
                 <a:spcPct val="90000"/>
               </a:lnSpc>
               <a:buClr>
                 <a:srgbClr val="000000"/>
               </a:buClr>
+              <a:buSzPct val="45000"/>
               <a:buFont typeface="Wingdings" charset="2"/>
-              <a:buAutoNum type="arabicParenR"/>
+              <a:buChar char=""/>
             </a:pPr>
             <a:r>
-              <a:rPr b="0" lang="en-US" sz="3200" spc="-1" strike="noStrike">
+              <a:rPr b="0" lang="en-US" sz="3600" spc="-1" strike="noStrike">
                 <a:solidFill>
                   <a:srgbClr val="000000"/>
                 </a:solidFill>
@@ -5032,17 +4943,51 @@
               <a:t> “</a:t>
             </a:r>
             <a:r>
-              <a:rPr b="0" lang="en-US" sz="3200" spc="-1" strike="noStrike">
+              <a:rPr b="0" lang="en-US" sz="3600" spc="-1" strike="noStrike">
                 <a:solidFill>
                   <a:srgbClr val="000000"/>
                 </a:solidFill>
                 <a:latin typeface="Source Sans Pro"/>
                 <a:ea typeface="Cambria"/>
               </a:rPr>
-              <a:t>Wordfind” utilizes a concurrent hashtable to find the largest word over 6 ASCII characters long in a given set of text files, usually books. Each file is scanned on a seperate thread, so the amount of work will go up when more files are provided, but that work will be distributed among the threads.</a:t>
+              <a:t>Wordfind” utilizes a concurrent hashtable to find the largest word over 6 ASCII characters long in a given set of text files, usually books.</a:t>
             </a:r>
-            <a:endParaRPr b="0" lang="en-US" sz="3200" spc="-1" strike="noStrike">
+            <a:endParaRPr b="0" lang="en-US" sz="3600" spc="-1" strike="noStrike">
               <a:latin typeface="Source Sans Pro"/>
+            </a:endParaRPr>
+          </a:p>
+        </p:txBody>
+      </p:sp>
+      <p:sp>
+        <p:nvSpPr>
+          <p:cNvPr id="108" name="TextShape 29"/>
+          <p:cNvSpPr txBox="1"/>
+          <p:nvPr/>
+        </p:nvSpPr>
+        <p:spPr>
+          <a:xfrm>
+            <a:off x="-1193760" y="15852240"/>
+            <a:ext cx="258480" cy="232560"/>
+          </a:xfrm>
+          <a:prstGeom prst="rect">
+            <a:avLst/>
+          </a:prstGeom>
+          <a:noFill/>
+          <a:ln>
+            <a:noFill/>
+          </a:ln>
+        </p:spPr>
+        <p:txBody>
+          <a:bodyPr lIns="90000" rIns="90000" tIns="45000" bIns="45000"/>
+          <a:p>
+            <a:r>
+              <a:rPr b="0" lang="en-US" sz="1000" spc="-1" strike="noStrike">
+                <a:latin typeface="Arial"/>
+              </a:rPr>
+              <a:t>T</a:t>
+            </a:r>
+            <a:endParaRPr b="0" lang="en-US" sz="1000" spc="-1" strike="noStrike">
+              <a:latin typeface="Arial"/>
             </a:endParaRPr>
           </a:p>
         </p:txBody>
@@ -5098,28 +5043,28 @@
       </p:grpSpPr>
       <p:grpSp>
         <p:nvGrpSpPr>
-          <p:cNvPr id="108" name="Group 1"/>
+          <p:cNvPr id="109" name="Group 1"/>
           <p:cNvGrpSpPr/>
           <p:nvPr/>
         </p:nvGrpSpPr>
         <p:grpSpPr>
           <a:xfrm>
             <a:off x="2743200" y="2439360"/>
-            <a:ext cx="38604240" cy="25992360"/>
+            <a:ext cx="38603880" cy="25992000"/>
             <a:chOff x="2743200" y="2439360"/>
-            <a:chExt cx="38604240" cy="25992360"/>
+            <a:chExt cx="38603880" cy="25992000"/>
           </a:xfrm>
         </p:grpSpPr>
         <p:sp>
           <p:nvSpPr>
-            <p:cNvPr id="109" name="CustomShape 2"/>
+            <p:cNvPr id="110" name="CustomShape 2"/>
             <p:cNvSpPr/>
             <p:nvPr/>
           </p:nvSpPr>
           <p:spPr>
             <a:xfrm>
               <a:off x="2743200" y="2439360"/>
-              <a:ext cx="38604240" cy="25992360"/>
+              <a:ext cx="38603880" cy="25992000"/>
             </a:xfrm>
             <a:prstGeom prst="rect">
               <a:avLst/>
@@ -5143,14 +5088,14 @@
         </p:sp>
         <p:sp>
           <p:nvSpPr>
-            <p:cNvPr id="110" name="CustomShape 3"/>
+            <p:cNvPr id="111" name="CustomShape 3"/>
             <p:cNvSpPr/>
             <p:nvPr/>
           </p:nvSpPr>
           <p:spPr>
             <a:xfrm>
               <a:off x="4692600" y="4613040"/>
-              <a:ext cx="33179760" cy="9448200"/>
+              <a:ext cx="33179400" cy="9447840"/>
             </a:xfrm>
             <a:prstGeom prst="rect">
               <a:avLst/>
@@ -5272,7 +5217,7 @@
         </p:sp>
         <p:pic>
           <p:nvPicPr>
-            <p:cNvPr id="111" name="Shape 121" descr=""/>
+            <p:cNvPr id="112" name="Shape 121" descr=""/>
             <p:cNvPicPr/>
             <p:nvPr/>
           </p:nvPicPr>
@@ -5283,7 +5228,7 @@
           <p:spPr>
             <a:xfrm>
               <a:off x="3781080" y="22556160"/>
-              <a:ext cx="3559320" cy="4494240"/>
+              <a:ext cx="3558960" cy="4493880"/>
             </a:xfrm>
             <a:prstGeom prst="rect">
               <a:avLst/>
@@ -5295,14 +5240,14 @@
         </p:pic>
         <p:sp>
           <p:nvSpPr>
-            <p:cNvPr id="112" name="CustomShape 4"/>
+            <p:cNvPr id="113" name="CustomShape 4"/>
             <p:cNvSpPr/>
             <p:nvPr/>
           </p:nvSpPr>
           <p:spPr>
             <a:xfrm>
               <a:off x="8972640" y="14938560"/>
-              <a:ext cx="26145360" cy="4031280"/>
+              <a:ext cx="26145000" cy="4030920"/>
             </a:xfrm>
             <a:prstGeom prst="rect">
               <a:avLst/>
@@ -5398,14 +5343,14 @@
         </p:sp>
         <p:sp>
           <p:nvSpPr>
-            <p:cNvPr id="113" name="CustomShape 5"/>
+            <p:cNvPr id="114" name="CustomShape 5"/>
             <p:cNvSpPr/>
             <p:nvPr/>
           </p:nvSpPr>
           <p:spPr>
             <a:xfrm>
               <a:off x="11886480" y="24033960"/>
-              <a:ext cx="28665000" cy="1938240"/>
+              <a:ext cx="28664640" cy="1937880"/>
             </a:xfrm>
             <a:prstGeom prst="rect">
               <a:avLst/>

</xml_diff>